<commit_message>
MCMC pic 10까지 작성 중
</commit_message>
<xml_diff>
--- a/pics/2020-09-17-MCMC/pics.pptx
+++ b/pics/2020-09-17-MCMC/pics.pptx
@@ -10,6 +10,9 @@
     <p:sldId id="258" r:id="rId4"/>
     <p:sldId id="259" r:id="rId5"/>
     <p:sldId id="260" r:id="rId6"/>
+    <p:sldId id="262" r:id="rId7"/>
+    <p:sldId id="261" r:id="rId8"/>
+    <p:sldId id="263" r:id="rId9"/>
   </p:sldIdLst>
   <p:sldSz cx="12192000" cy="6858000"/>
   <p:notesSz cx="6858000" cy="9144000"/>
@@ -263,7 +266,7 @@
           <a:p>
             <a:fld id="{5FFD4891-059D-4F08-8A94-92885868D870}" type="datetimeFigureOut">
               <a:rPr lang="ko-KR" altLang="en-US" smtClean="0"/>
-              <a:t>2020-09-18</a:t>
+              <a:t>2020-09-19</a:t>
             </a:fld>
             <a:endParaRPr lang="ko-KR" altLang="en-US"/>
           </a:p>
@@ -461,7 +464,7 @@
           <a:p>
             <a:fld id="{5FFD4891-059D-4F08-8A94-92885868D870}" type="datetimeFigureOut">
               <a:rPr lang="ko-KR" altLang="en-US" smtClean="0"/>
-              <a:t>2020-09-18</a:t>
+              <a:t>2020-09-19</a:t>
             </a:fld>
             <a:endParaRPr lang="ko-KR" altLang="en-US"/>
           </a:p>
@@ -669,7 +672,7 @@
           <a:p>
             <a:fld id="{5FFD4891-059D-4F08-8A94-92885868D870}" type="datetimeFigureOut">
               <a:rPr lang="ko-KR" altLang="en-US" smtClean="0"/>
-              <a:t>2020-09-18</a:t>
+              <a:t>2020-09-19</a:t>
             </a:fld>
             <a:endParaRPr lang="ko-KR" altLang="en-US"/>
           </a:p>
@@ -867,7 +870,7 @@
           <a:p>
             <a:fld id="{5FFD4891-059D-4F08-8A94-92885868D870}" type="datetimeFigureOut">
               <a:rPr lang="ko-KR" altLang="en-US" smtClean="0"/>
-              <a:t>2020-09-18</a:t>
+              <a:t>2020-09-19</a:t>
             </a:fld>
             <a:endParaRPr lang="ko-KR" altLang="en-US"/>
           </a:p>
@@ -1142,7 +1145,7 @@
           <a:p>
             <a:fld id="{5FFD4891-059D-4F08-8A94-92885868D870}" type="datetimeFigureOut">
               <a:rPr lang="ko-KR" altLang="en-US" smtClean="0"/>
-              <a:t>2020-09-18</a:t>
+              <a:t>2020-09-19</a:t>
             </a:fld>
             <a:endParaRPr lang="ko-KR" altLang="en-US"/>
           </a:p>
@@ -1407,7 +1410,7 @@
           <a:p>
             <a:fld id="{5FFD4891-059D-4F08-8A94-92885868D870}" type="datetimeFigureOut">
               <a:rPr lang="ko-KR" altLang="en-US" smtClean="0"/>
-              <a:t>2020-09-18</a:t>
+              <a:t>2020-09-19</a:t>
             </a:fld>
             <a:endParaRPr lang="ko-KR" altLang="en-US"/>
           </a:p>
@@ -1819,7 +1822,7 @@
           <a:p>
             <a:fld id="{5FFD4891-059D-4F08-8A94-92885868D870}" type="datetimeFigureOut">
               <a:rPr lang="ko-KR" altLang="en-US" smtClean="0"/>
-              <a:t>2020-09-18</a:t>
+              <a:t>2020-09-19</a:t>
             </a:fld>
             <a:endParaRPr lang="ko-KR" altLang="en-US"/>
           </a:p>
@@ -1960,7 +1963,7 @@
           <a:p>
             <a:fld id="{5FFD4891-059D-4F08-8A94-92885868D870}" type="datetimeFigureOut">
               <a:rPr lang="ko-KR" altLang="en-US" smtClean="0"/>
-              <a:t>2020-09-18</a:t>
+              <a:t>2020-09-19</a:t>
             </a:fld>
             <a:endParaRPr lang="ko-KR" altLang="en-US"/>
           </a:p>
@@ -2073,7 +2076,7 @@
           <a:p>
             <a:fld id="{5FFD4891-059D-4F08-8A94-92885868D870}" type="datetimeFigureOut">
               <a:rPr lang="ko-KR" altLang="en-US" smtClean="0"/>
-              <a:t>2020-09-18</a:t>
+              <a:t>2020-09-19</a:t>
             </a:fld>
             <a:endParaRPr lang="ko-KR" altLang="en-US"/>
           </a:p>
@@ -2384,7 +2387,7 @@
           <a:p>
             <a:fld id="{5FFD4891-059D-4F08-8A94-92885868D870}" type="datetimeFigureOut">
               <a:rPr lang="ko-KR" altLang="en-US" smtClean="0"/>
-              <a:t>2020-09-18</a:t>
+              <a:t>2020-09-19</a:t>
             </a:fld>
             <a:endParaRPr lang="ko-KR" altLang="en-US"/>
           </a:p>
@@ -2672,7 +2675,7 @@
           <a:p>
             <a:fld id="{5FFD4891-059D-4F08-8A94-92885868D870}" type="datetimeFigureOut">
               <a:rPr lang="ko-KR" altLang="en-US" smtClean="0"/>
-              <a:t>2020-09-18</a:t>
+              <a:t>2020-09-19</a:t>
             </a:fld>
             <a:endParaRPr lang="ko-KR" altLang="en-US"/>
           </a:p>
@@ -2913,7 +2916,7 @@
           <a:p>
             <a:fld id="{5FFD4891-059D-4F08-8A94-92885868D870}" type="datetimeFigureOut">
               <a:rPr lang="ko-KR" altLang="en-US" smtClean="0"/>
-              <a:t>2020-09-18</a:t>
+              <a:t>2020-09-19</a:t>
             </a:fld>
             <a:endParaRPr lang="ko-KR" altLang="en-US"/>
           </a:p>
@@ -4661,6 +4664,918 @@
 </p:sld>
 </file>
 
+<file path=ppt/slides/slide6.xml><?xml version="1.0" encoding="utf-8"?>
+<p:sld xmlns:a="http://schemas.openxmlformats.org/drawingml/2006/main" xmlns:r="http://schemas.openxmlformats.org/officeDocument/2006/relationships" xmlns:p="http://schemas.openxmlformats.org/presentationml/2006/main">
+  <p:cSld>
+    <p:spTree>
+      <p:nvGrpSpPr>
+        <p:cNvPr id="1" name=""/>
+        <p:cNvGrpSpPr/>
+        <p:nvPr/>
+      </p:nvGrpSpPr>
+      <p:grpSpPr>
+        <a:xfrm>
+          <a:off x="0" y="0"/>
+          <a:ext cx="0" cy="0"/>
+          <a:chOff x="0" y="0"/>
+          <a:chExt cx="0" cy="0"/>
+        </a:xfrm>
+      </p:grpSpPr>
+      <p:pic>
+        <p:nvPicPr>
+          <p:cNvPr id="4" name="그림 3">
+            <a:extLst>
+              <a:ext uri="{FF2B5EF4-FFF2-40B4-BE49-F238E27FC236}">
+                <a16:creationId xmlns:a16="http://schemas.microsoft.com/office/drawing/2014/main" id="{E1BF1DF9-D847-4458-94D3-97F362B91986}"/>
+              </a:ext>
+            </a:extLst>
+          </p:cNvPr>
+          <p:cNvPicPr>
+            <a:picLocks noChangeAspect="1"/>
+          </p:cNvPicPr>
+          <p:nvPr/>
+        </p:nvPicPr>
+        <p:blipFill>
+          <a:blip r:embed="rId2"/>
+          <a:stretch>
+            <a:fillRect/>
+          </a:stretch>
+        </p:blipFill>
+        <p:spPr>
+          <a:xfrm>
+            <a:off x="1388882" y="750021"/>
+            <a:ext cx="9414236" cy="5357958"/>
+          </a:xfrm>
+          <a:prstGeom prst="rect">
+            <a:avLst/>
+          </a:prstGeom>
+        </p:spPr>
+      </p:pic>
+      <mc:AlternateContent xmlns:mc="http://schemas.openxmlformats.org/markup-compatibility/2006">
+        <mc:Choice xmlns:a14="http://schemas.microsoft.com/office/drawing/2010/main" Requires="a14">
+          <p:sp>
+            <p:nvSpPr>
+              <p:cNvPr id="5" name="TextBox 4">
+                <a:extLst>
+                  <a:ext uri="{FF2B5EF4-FFF2-40B4-BE49-F238E27FC236}">
+                    <a16:creationId xmlns:a16="http://schemas.microsoft.com/office/drawing/2014/main" id="{9DE7F6E5-9D43-43F7-904D-914D492A2A79}"/>
+                  </a:ext>
+                </a:extLst>
+              </p:cNvPr>
+              <p:cNvSpPr txBox="1"/>
+              <p:nvPr/>
+            </p:nvSpPr>
+            <p:spPr>
+              <a:xfrm>
+                <a:off x="5539818" y="1480008"/>
+                <a:ext cx="4037815" cy="519351"/>
+              </a:xfrm>
+              <a:prstGeom prst="wedgeEllipseCallout">
+                <a:avLst>
+                  <a:gd name="adj1" fmla="val -35140"/>
+                  <a:gd name="adj2" fmla="val 90473"/>
+                </a:avLst>
+              </a:prstGeom>
+              <a:noFill/>
+              <a:ln>
+                <a:solidFill>
+                  <a:schemeClr val="tx1"/>
+                </a:solidFill>
+              </a:ln>
+            </p:spPr>
+            <p:txBody>
+              <a:bodyPr wrap="square" rtlCol="0">
+                <a:spAutoFit/>
+              </a:bodyPr>
+              <a:lstStyle/>
+              <a:p>
+                <a:r>
+                  <a:rPr lang="ko-KR" altLang="en-US" dirty="0">
+                    <a:latin typeface="배달의민족 주아" panose="02020603020101020101" pitchFamily="18" charset="-127"/>
+                    <a:ea typeface="배달의민족 주아" panose="02020603020101020101" pitchFamily="18" charset="-127"/>
+                  </a:rPr>
+                  <a:t>음</a:t>
+                </a:r>
+                <a:r>
+                  <a:rPr lang="en-US" altLang="ko-KR" dirty="0">
+                    <a:latin typeface="배달의민족 주아" panose="02020603020101020101" pitchFamily="18" charset="-127"/>
+                    <a:ea typeface="배달의민족 주아" panose="02020603020101020101" pitchFamily="18" charset="-127"/>
+                  </a:rPr>
+                  <a:t>… </a:t>
+                </a:r>
+                <a:r>
+                  <a:rPr lang="ko-KR" altLang="en-US" dirty="0">
+                    <a:latin typeface="배달의민족 주아" panose="02020603020101020101" pitchFamily="18" charset="-127"/>
+                    <a:ea typeface="배달의민족 주아" panose="02020603020101020101" pitchFamily="18" charset="-127"/>
+                  </a:rPr>
+                  <a:t>다음 번 </a:t>
+                </a:r>
+                <a14:m>
+                  <m:oMath xmlns:m="http://schemas.openxmlformats.org/officeDocument/2006/math">
+                    <m:r>
+                      <a:rPr lang="en-US" altLang="ko-KR" b="0" i="1" smtClean="0">
+                        <a:latin typeface="Cambria Math" panose="02040503050406030204" pitchFamily="18" charset="0"/>
+                      </a:rPr>
+                      <m:t>𝜇</m:t>
+                    </m:r>
+                  </m:oMath>
+                </a14:m>
+                <a:r>
+                  <a:rPr lang="ko-KR" altLang="en-US" dirty="0">
+                    <a:latin typeface="배달의민족 주아" panose="02020603020101020101" pitchFamily="18" charset="-127"/>
+                    <a:ea typeface="배달의민족 주아" panose="02020603020101020101" pitchFamily="18" charset="-127"/>
+                  </a:rPr>
+                  <a:t> 값의 후보는</a:t>
+                </a:r>
+                <a:r>
+                  <a:rPr lang="en-US" altLang="ko-KR" dirty="0">
+                    <a:latin typeface="배달의민족 주아" panose="02020603020101020101" pitchFamily="18" charset="-127"/>
+                    <a:ea typeface="배달의민족 주아" panose="02020603020101020101" pitchFamily="18" charset="-127"/>
+                  </a:rPr>
+                  <a:t>…!</a:t>
+                </a:r>
+                <a:endParaRPr lang="ko-KR" altLang="en-US" dirty="0">
+                  <a:latin typeface="배달의민족 주아" panose="02020603020101020101" pitchFamily="18" charset="-127"/>
+                  <a:ea typeface="배달의민족 주아" panose="02020603020101020101" pitchFamily="18" charset="-127"/>
+                </a:endParaRPr>
+              </a:p>
+            </p:txBody>
+          </p:sp>
+        </mc:Choice>
+        <mc:Fallback>
+          <p:sp>
+            <p:nvSpPr>
+              <p:cNvPr id="5" name="TextBox 4">
+                <a:extLst>
+                  <a:ext uri="{FF2B5EF4-FFF2-40B4-BE49-F238E27FC236}">
+                    <a16:creationId xmlns:a16="http://schemas.microsoft.com/office/drawing/2014/main" id="{9DE7F6E5-9D43-43F7-904D-914D492A2A79}"/>
+                  </a:ext>
+                </a:extLst>
+              </p:cNvPr>
+              <p:cNvSpPr txBox="1">
+                <a:spLocks noRot="1" noChangeAspect="1" noMove="1" noResize="1" noEditPoints="1" noAdjustHandles="1" noChangeArrowheads="1" noChangeShapeType="1" noTextEdit="1"/>
+              </p:cNvSpPr>
+              <p:nvPr/>
+            </p:nvSpPr>
+            <p:spPr>
+              <a:xfrm>
+                <a:off x="5539818" y="1480008"/>
+                <a:ext cx="4037815" cy="519351"/>
+              </a:xfrm>
+              <a:prstGeom prst="wedgeEllipseCallout">
+                <a:avLst>
+                  <a:gd name="adj1" fmla="val -35140"/>
+                  <a:gd name="adj2" fmla="val 90473"/>
+                </a:avLst>
+              </a:prstGeom>
+              <a:blipFill>
+                <a:blip r:embed="rId3"/>
+                <a:stretch>
+                  <a:fillRect/>
+                </a:stretch>
+              </a:blipFill>
+              <a:ln>
+                <a:solidFill>
+                  <a:schemeClr val="tx1"/>
+                </a:solidFill>
+              </a:ln>
+            </p:spPr>
+            <p:txBody>
+              <a:bodyPr/>
+              <a:lstStyle/>
+              <a:p>
+                <a:r>
+                  <a:rPr lang="ko-KR" altLang="en-US">
+                    <a:noFill/>
+                  </a:rPr>
+                  <a:t> </a:t>
+                </a:r>
+              </a:p>
+            </p:txBody>
+          </p:sp>
+        </mc:Fallback>
+      </mc:AlternateContent>
+      <p:sp>
+        <p:nvSpPr>
+          <p:cNvPr id="6" name="TextBox 5">
+            <a:extLst>
+              <a:ext uri="{FF2B5EF4-FFF2-40B4-BE49-F238E27FC236}">
+                <a16:creationId xmlns:a16="http://schemas.microsoft.com/office/drawing/2014/main" id="{9F53B707-B48A-4C92-BB6B-B259C38B5636}"/>
+              </a:ext>
+            </a:extLst>
+          </p:cNvPr>
+          <p:cNvSpPr txBox="1"/>
+          <p:nvPr/>
+        </p:nvSpPr>
+        <p:spPr>
+          <a:xfrm>
+            <a:off x="4100660" y="750021"/>
+            <a:ext cx="1838965" cy="369332"/>
+          </a:xfrm>
+          <a:prstGeom prst="rect">
+            <a:avLst/>
+          </a:prstGeom>
+          <a:noFill/>
+        </p:spPr>
+        <p:txBody>
+          <a:bodyPr wrap="none" rtlCol="0">
+            <a:spAutoFit/>
+          </a:bodyPr>
+          <a:lstStyle/>
+          <a:p>
+            <a:r>
+              <a:rPr lang="ko-KR" altLang="en-US" dirty="0">
+                <a:latin typeface="카페24 쑥쑥" pitchFamily="2" charset="-127"/>
+                <a:ea typeface="카페24 쑥쑥" pitchFamily="2" charset="-127"/>
+              </a:rPr>
+              <a:t>나</a:t>
+            </a:r>
+            <a:r>
+              <a:rPr lang="en-US" altLang="ko-KR" dirty="0">
+                <a:latin typeface="카페24 쑥쑥" pitchFamily="2" charset="-127"/>
+                <a:ea typeface="카페24 쑥쑥" pitchFamily="2" charset="-127"/>
+              </a:rPr>
+              <a:t>? </a:t>
+            </a:r>
+            <a:r>
+              <a:rPr lang="ko-KR" altLang="en-US" dirty="0">
+                <a:latin typeface="카페24 쑥쑥" pitchFamily="2" charset="-127"/>
+                <a:ea typeface="카페24 쑥쑥" pitchFamily="2" charset="-127"/>
+              </a:rPr>
+              <a:t>나는 제안분포</a:t>
+            </a:r>
+            <a:r>
+              <a:rPr lang="en-US" altLang="ko-KR" dirty="0">
+                <a:latin typeface="카페24 쑥쑥" pitchFamily="2" charset="-127"/>
+                <a:ea typeface="카페24 쑥쑥" pitchFamily="2" charset="-127"/>
+              </a:rPr>
+              <a:t>!</a:t>
+            </a:r>
+            <a:endParaRPr lang="ko-KR" altLang="en-US" dirty="0">
+              <a:latin typeface="카페24 쑥쑥" pitchFamily="2" charset="-127"/>
+              <a:ea typeface="카페24 쑥쑥" pitchFamily="2" charset="-127"/>
+            </a:endParaRPr>
+          </a:p>
+        </p:txBody>
+      </p:sp>
+    </p:spTree>
+    <p:extLst>
+      <p:ext uri="{BB962C8B-B14F-4D97-AF65-F5344CB8AC3E}">
+        <p14:creationId xmlns:p14="http://schemas.microsoft.com/office/powerpoint/2010/main" val="213949354"/>
+      </p:ext>
+    </p:extLst>
+  </p:cSld>
+  <p:clrMapOvr>
+    <a:masterClrMapping/>
+  </p:clrMapOvr>
+</p:sld>
+</file>
+
+<file path=ppt/slides/slide7.xml><?xml version="1.0" encoding="utf-8"?>
+<p:sld xmlns:a="http://schemas.openxmlformats.org/drawingml/2006/main" xmlns:r="http://schemas.openxmlformats.org/officeDocument/2006/relationships" xmlns:p="http://schemas.openxmlformats.org/presentationml/2006/main">
+  <p:cSld>
+    <p:spTree>
+      <p:nvGrpSpPr>
+        <p:cNvPr id="1" name=""/>
+        <p:cNvGrpSpPr/>
+        <p:nvPr/>
+      </p:nvGrpSpPr>
+      <p:grpSpPr>
+        <a:xfrm>
+          <a:off x="0" y="0"/>
+          <a:ext cx="0" cy="0"/>
+          <a:chOff x="0" y="0"/>
+          <a:chExt cx="0" cy="0"/>
+        </a:xfrm>
+      </p:grpSpPr>
+      <p:pic>
+        <p:nvPicPr>
+          <p:cNvPr id="7" name="그림 6">
+            <a:extLst>
+              <a:ext uri="{FF2B5EF4-FFF2-40B4-BE49-F238E27FC236}">
+                <a16:creationId xmlns:a16="http://schemas.microsoft.com/office/drawing/2014/main" id="{12A30D80-B010-407C-8B36-1A268D385644}"/>
+              </a:ext>
+            </a:extLst>
+          </p:cNvPr>
+          <p:cNvPicPr>
+            <a:picLocks noChangeAspect="1"/>
+          </p:cNvPicPr>
+          <p:nvPr/>
+        </p:nvPicPr>
+        <p:blipFill>
+          <a:blip r:embed="rId2"/>
+          <a:stretch>
+            <a:fillRect/>
+          </a:stretch>
+        </p:blipFill>
+        <p:spPr>
+          <a:xfrm>
+            <a:off x="1280184" y="688157"/>
+            <a:ext cx="9631632" cy="5481686"/>
+          </a:xfrm>
+          <a:prstGeom prst="rect">
+            <a:avLst/>
+          </a:prstGeom>
+        </p:spPr>
+      </p:pic>
+      <mc:AlternateContent xmlns:mc="http://schemas.openxmlformats.org/markup-compatibility/2006">
+        <mc:Choice xmlns:a14="http://schemas.microsoft.com/office/drawing/2010/main" Requires="a14">
+          <p:sp>
+            <p:nvSpPr>
+              <p:cNvPr id="5" name="TextBox 4">
+                <a:extLst>
+                  <a:ext uri="{FF2B5EF4-FFF2-40B4-BE49-F238E27FC236}">
+                    <a16:creationId xmlns:a16="http://schemas.microsoft.com/office/drawing/2014/main" id="{655D8B22-3EE2-4BA9-B650-601BB726175A}"/>
+                  </a:ext>
+                </a:extLst>
+              </p:cNvPr>
+              <p:cNvSpPr txBox="1"/>
+              <p:nvPr/>
+            </p:nvSpPr>
+            <p:spPr>
+              <a:xfrm>
+                <a:off x="2545233" y="2450968"/>
+                <a:ext cx="3698000" cy="400110"/>
+              </a:xfrm>
+              <a:prstGeom prst="rect">
+                <a:avLst/>
+              </a:prstGeom>
+              <a:noFill/>
+            </p:spPr>
+            <p:txBody>
+              <a:bodyPr wrap="none" rtlCol="0">
+                <a:spAutoFit/>
+              </a:bodyPr>
+              <a:lstStyle/>
+              <a:p>
+                <a14:m>
+                  <m:oMath xmlns:m="http://schemas.openxmlformats.org/officeDocument/2006/math">
+                    <m:r>
+                      <a:rPr lang="en-US" altLang="ko-KR" sz="2000" b="1" i="1" smtClean="0">
+                        <a:solidFill>
+                          <a:srgbClr val="D95319"/>
+                        </a:solidFill>
+                        <a:latin typeface="Cambria Math" panose="02040503050406030204" pitchFamily="18" charset="0"/>
+                      </a:rPr>
+                      <m:t>𝝁</m:t>
+                    </m:r>
+                    <m:r>
+                      <a:rPr lang="en-US" altLang="ko-KR" sz="2000" b="1" i="1" smtClean="0">
+                        <a:solidFill>
+                          <a:srgbClr val="D95319"/>
+                        </a:solidFill>
+                        <a:latin typeface="Cambria Math" panose="02040503050406030204" pitchFamily="18" charset="0"/>
+                      </a:rPr>
+                      <m:t>=</m:t>
+                    </m:r>
+                    <m:sSub>
+                      <m:sSubPr>
+                        <m:ctrlPr>
+                          <a:rPr lang="en-US" altLang="ko-KR" sz="2000" b="1" i="1" smtClean="0">
+                            <a:solidFill>
+                              <a:srgbClr val="D95319"/>
+                            </a:solidFill>
+                            <a:latin typeface="Cambria Math" panose="02040503050406030204" pitchFamily="18" charset="0"/>
+                          </a:rPr>
+                        </m:ctrlPr>
+                      </m:sSubPr>
+                      <m:e>
+                        <m:r>
+                          <a:rPr lang="en-US" altLang="ko-KR" sz="2000" b="1" i="1" smtClean="0">
+                            <a:solidFill>
+                              <a:srgbClr val="D95319"/>
+                            </a:solidFill>
+                            <a:latin typeface="Cambria Math" panose="02040503050406030204" pitchFamily="18" charset="0"/>
+                          </a:rPr>
+                          <m:t>𝝁</m:t>
+                        </m:r>
+                      </m:e>
+                      <m:sub>
+                        <m:r>
+                          <a:rPr lang="en-US" altLang="ko-KR" sz="2000" b="1" i="1" smtClean="0">
+                            <a:solidFill>
+                              <a:srgbClr val="D95319"/>
+                            </a:solidFill>
+                            <a:latin typeface="Cambria Math" panose="02040503050406030204" pitchFamily="18" charset="0"/>
+                          </a:rPr>
+                          <m:t>𝒐𝒍𝒅</m:t>
+                        </m:r>
+                      </m:sub>
+                    </m:sSub>
+                  </m:oMath>
+                </a14:m>
+                <a:r>
+                  <a:rPr lang="ko-KR" altLang="en-US" sz="2000" b="1" dirty="0">
+                    <a:solidFill>
+                      <a:srgbClr val="D95319"/>
+                    </a:solidFill>
+                  </a:rPr>
+                  <a:t>인 경우의 </a:t>
+                </a:r>
+                <a:r>
+                  <a:rPr lang="en-US" altLang="ko-KR" sz="2000" b="1" dirty="0">
+                    <a:solidFill>
+                      <a:srgbClr val="D95319"/>
+                    </a:solidFill>
+                  </a:rPr>
+                  <a:t>target </a:t>
+                </a:r>
+                <a:r>
+                  <a:rPr lang="ko-KR" altLang="en-US" sz="2000" b="1" dirty="0">
+                    <a:solidFill>
+                      <a:srgbClr val="D95319"/>
+                    </a:solidFill>
+                  </a:rPr>
+                  <a:t>분포</a:t>
+                </a:r>
+              </a:p>
+            </p:txBody>
+          </p:sp>
+        </mc:Choice>
+        <mc:Fallback>
+          <p:sp>
+            <p:nvSpPr>
+              <p:cNvPr id="5" name="TextBox 4">
+                <a:extLst>
+                  <a:ext uri="{FF2B5EF4-FFF2-40B4-BE49-F238E27FC236}">
+                    <a16:creationId xmlns:a16="http://schemas.microsoft.com/office/drawing/2014/main" id="{655D8B22-3EE2-4BA9-B650-601BB726175A}"/>
+                  </a:ext>
+                </a:extLst>
+              </p:cNvPr>
+              <p:cNvSpPr txBox="1">
+                <a:spLocks noRot="1" noChangeAspect="1" noMove="1" noResize="1" noEditPoints="1" noAdjustHandles="1" noChangeArrowheads="1" noChangeShapeType="1" noTextEdit="1"/>
+              </p:cNvSpPr>
+              <p:nvPr/>
+            </p:nvSpPr>
+            <p:spPr>
+              <a:xfrm>
+                <a:off x="2545233" y="2450968"/>
+                <a:ext cx="3698000" cy="400110"/>
+              </a:xfrm>
+              <a:prstGeom prst="rect">
+                <a:avLst/>
+              </a:prstGeom>
+              <a:blipFill>
+                <a:blip r:embed="rId3"/>
+                <a:stretch>
+                  <a:fillRect t="-7576" r="-825" b="-25758"/>
+                </a:stretch>
+              </a:blipFill>
+            </p:spPr>
+            <p:txBody>
+              <a:bodyPr/>
+              <a:lstStyle/>
+              <a:p>
+                <a:r>
+                  <a:rPr lang="ko-KR" altLang="en-US">
+                    <a:noFill/>
+                  </a:rPr>
+                  <a:t> </a:t>
+                </a:r>
+              </a:p>
+            </p:txBody>
+          </p:sp>
+        </mc:Fallback>
+      </mc:AlternateContent>
+      <mc:AlternateContent xmlns:mc="http://schemas.openxmlformats.org/markup-compatibility/2006">
+        <mc:Choice xmlns:a14="http://schemas.microsoft.com/office/drawing/2010/main" Requires="a14">
+          <p:sp>
+            <p:nvSpPr>
+              <p:cNvPr id="6" name="TextBox 5">
+                <a:extLst>
+                  <a:ext uri="{FF2B5EF4-FFF2-40B4-BE49-F238E27FC236}">
+                    <a16:creationId xmlns:a16="http://schemas.microsoft.com/office/drawing/2014/main" id="{460A3BB2-5654-4421-9CB8-AEEF16F65603}"/>
+                  </a:ext>
+                </a:extLst>
+              </p:cNvPr>
+              <p:cNvSpPr txBox="1"/>
+              <p:nvPr/>
+            </p:nvSpPr>
+            <p:spPr>
+              <a:xfrm>
+                <a:off x="6243233" y="2488674"/>
+                <a:ext cx="3773341" cy="400110"/>
+              </a:xfrm>
+              <a:prstGeom prst="rect">
+                <a:avLst/>
+              </a:prstGeom>
+              <a:noFill/>
+            </p:spPr>
+            <p:txBody>
+              <a:bodyPr wrap="none" rtlCol="0">
+                <a:spAutoFit/>
+              </a:bodyPr>
+              <a:lstStyle/>
+              <a:p>
+                <a14:m>
+                  <m:oMath xmlns:m="http://schemas.openxmlformats.org/officeDocument/2006/math">
+                    <m:r>
+                      <a:rPr lang="en-US" altLang="ko-KR" sz="2000" b="1" i="1" smtClean="0">
+                        <a:solidFill>
+                          <a:srgbClr val="0072BD"/>
+                        </a:solidFill>
+                        <a:latin typeface="Cambria Math" panose="02040503050406030204" pitchFamily="18" charset="0"/>
+                      </a:rPr>
+                      <m:t>𝝁</m:t>
+                    </m:r>
+                    <m:r>
+                      <a:rPr lang="en-US" altLang="ko-KR" sz="2000" b="1" i="1" smtClean="0">
+                        <a:solidFill>
+                          <a:srgbClr val="0072BD"/>
+                        </a:solidFill>
+                        <a:latin typeface="Cambria Math" panose="02040503050406030204" pitchFamily="18" charset="0"/>
+                      </a:rPr>
+                      <m:t>=</m:t>
+                    </m:r>
+                    <m:sSub>
+                      <m:sSubPr>
+                        <m:ctrlPr>
+                          <a:rPr lang="en-US" altLang="ko-KR" sz="2000" b="1" i="1" smtClean="0">
+                            <a:solidFill>
+                              <a:srgbClr val="0072BD"/>
+                            </a:solidFill>
+                            <a:latin typeface="Cambria Math" panose="02040503050406030204" pitchFamily="18" charset="0"/>
+                          </a:rPr>
+                        </m:ctrlPr>
+                      </m:sSubPr>
+                      <m:e>
+                        <m:r>
+                          <a:rPr lang="en-US" altLang="ko-KR" sz="2000" b="1" i="1" smtClean="0">
+                            <a:solidFill>
+                              <a:srgbClr val="0072BD"/>
+                            </a:solidFill>
+                            <a:latin typeface="Cambria Math" panose="02040503050406030204" pitchFamily="18" charset="0"/>
+                          </a:rPr>
+                          <m:t>𝝁</m:t>
+                        </m:r>
+                      </m:e>
+                      <m:sub>
+                        <m:r>
+                          <a:rPr lang="en-US" altLang="ko-KR" sz="2000" b="1" i="1" smtClean="0">
+                            <a:solidFill>
+                              <a:srgbClr val="0072BD"/>
+                            </a:solidFill>
+                            <a:latin typeface="Cambria Math" panose="02040503050406030204" pitchFamily="18" charset="0"/>
+                          </a:rPr>
+                          <m:t>𝒏𝒆𝒘</m:t>
+                        </m:r>
+                      </m:sub>
+                    </m:sSub>
+                  </m:oMath>
+                </a14:m>
+                <a:r>
+                  <a:rPr lang="ko-KR" altLang="en-US" sz="2000" b="1" dirty="0">
+                    <a:solidFill>
+                      <a:srgbClr val="0072BD"/>
+                    </a:solidFill>
+                  </a:rPr>
+                  <a:t>인 경우의 </a:t>
+                </a:r>
+                <a:r>
+                  <a:rPr lang="en-US" altLang="ko-KR" sz="2000" b="1" dirty="0">
+                    <a:solidFill>
+                      <a:srgbClr val="0072BD"/>
+                    </a:solidFill>
+                  </a:rPr>
+                  <a:t>target </a:t>
+                </a:r>
+                <a:r>
+                  <a:rPr lang="ko-KR" altLang="en-US" sz="2000" b="1" dirty="0">
+                    <a:solidFill>
+                      <a:srgbClr val="0072BD"/>
+                    </a:solidFill>
+                  </a:rPr>
+                  <a:t>분포</a:t>
+                </a:r>
+              </a:p>
+            </p:txBody>
+          </p:sp>
+        </mc:Choice>
+        <mc:Fallback>
+          <p:sp>
+            <p:nvSpPr>
+              <p:cNvPr id="6" name="TextBox 5">
+                <a:extLst>
+                  <a:ext uri="{FF2B5EF4-FFF2-40B4-BE49-F238E27FC236}">
+                    <a16:creationId xmlns:a16="http://schemas.microsoft.com/office/drawing/2014/main" id="{460A3BB2-5654-4421-9CB8-AEEF16F65603}"/>
+                  </a:ext>
+                </a:extLst>
+              </p:cNvPr>
+              <p:cNvSpPr txBox="1">
+                <a:spLocks noRot="1" noChangeAspect="1" noMove="1" noResize="1" noEditPoints="1" noAdjustHandles="1" noChangeArrowheads="1" noChangeShapeType="1" noTextEdit="1"/>
+              </p:cNvSpPr>
+              <p:nvPr/>
+            </p:nvSpPr>
+            <p:spPr>
+              <a:xfrm>
+                <a:off x="6243233" y="2488674"/>
+                <a:ext cx="3773341" cy="400110"/>
+              </a:xfrm>
+              <a:prstGeom prst="rect">
+                <a:avLst/>
+              </a:prstGeom>
+              <a:blipFill>
+                <a:blip r:embed="rId4"/>
+                <a:stretch>
+                  <a:fillRect t="-7576" r="-969" b="-25758"/>
+                </a:stretch>
+              </a:blipFill>
+            </p:spPr>
+            <p:txBody>
+              <a:bodyPr/>
+              <a:lstStyle/>
+              <a:p>
+                <a:r>
+                  <a:rPr lang="ko-KR" altLang="en-US">
+                    <a:noFill/>
+                  </a:rPr>
+                  <a:t> </a:t>
+                </a:r>
+              </a:p>
+            </p:txBody>
+          </p:sp>
+        </mc:Fallback>
+      </mc:AlternateContent>
+      <p:sp>
+        <p:nvSpPr>
+          <p:cNvPr id="8" name="화살표: 아래로 구부러짐 7">
+            <a:extLst>
+              <a:ext uri="{FF2B5EF4-FFF2-40B4-BE49-F238E27FC236}">
+                <a16:creationId xmlns:a16="http://schemas.microsoft.com/office/drawing/2014/main" id="{21B49D5C-C798-4CC3-91AC-E0A1C099B5F1}"/>
+              </a:ext>
+            </a:extLst>
+          </p:cNvPr>
+          <p:cNvSpPr/>
+          <p:nvPr/>
+        </p:nvSpPr>
+        <p:spPr>
+          <a:xfrm>
+            <a:off x="4751108" y="1681742"/>
+            <a:ext cx="2516957" cy="731520"/>
+          </a:xfrm>
+          <a:prstGeom prst="curvedDownArrow">
+            <a:avLst/>
+          </a:prstGeom>
+          <a:solidFill>
+            <a:schemeClr val="accent4"/>
+          </a:solidFill>
+        </p:spPr>
+        <p:style>
+          <a:lnRef idx="2">
+            <a:schemeClr val="accent1">
+              <a:shade val="50000"/>
+            </a:schemeClr>
+          </a:lnRef>
+          <a:fillRef idx="1">
+            <a:schemeClr val="accent1"/>
+          </a:fillRef>
+          <a:effectRef idx="0">
+            <a:schemeClr val="accent1"/>
+          </a:effectRef>
+          <a:fontRef idx="minor">
+            <a:schemeClr val="lt1"/>
+          </a:fontRef>
+        </p:style>
+        <p:txBody>
+          <a:bodyPr rtlCol="0" anchor="ctr"/>
+          <a:lstStyle/>
+          <a:p>
+            <a:pPr algn="ctr"/>
+            <a:endParaRPr lang="ko-KR" altLang="en-US">
+              <a:solidFill>
+                <a:schemeClr val="tx1"/>
+              </a:solidFill>
+            </a:endParaRPr>
+          </a:p>
+        </p:txBody>
+      </p:sp>
+      <p:sp>
+        <p:nvSpPr>
+          <p:cNvPr id="9" name="TextBox 8">
+            <a:extLst>
+              <a:ext uri="{FF2B5EF4-FFF2-40B4-BE49-F238E27FC236}">
+                <a16:creationId xmlns:a16="http://schemas.microsoft.com/office/drawing/2014/main" id="{4AD6A921-4349-46C5-8DCC-7C6E56512F61}"/>
+              </a:ext>
+            </a:extLst>
+          </p:cNvPr>
+          <p:cNvSpPr txBox="1"/>
+          <p:nvPr/>
+        </p:nvSpPr>
+        <p:spPr>
+          <a:xfrm>
+            <a:off x="4893222" y="1265375"/>
+            <a:ext cx="2232727" cy="369332"/>
+          </a:xfrm>
+          <a:prstGeom prst="rect">
+            <a:avLst/>
+          </a:prstGeom>
+          <a:noFill/>
+        </p:spPr>
+        <p:txBody>
+          <a:bodyPr wrap="none" rtlCol="0">
+            <a:spAutoFit/>
+          </a:bodyPr>
+          <a:lstStyle/>
+          <a:p>
+            <a:r>
+              <a:rPr lang="en-US" altLang="ko-KR" dirty="0">
+                <a:latin typeface="Tium" panose="02000800000000000000" pitchFamily="2" charset="0"/>
+              </a:rPr>
+              <a:t>Accept ? Or Reject?</a:t>
+            </a:r>
+            <a:endParaRPr lang="ko-KR" altLang="en-US" dirty="0">
+              <a:latin typeface="Tium" panose="02000800000000000000" pitchFamily="2" charset="0"/>
+            </a:endParaRPr>
+          </a:p>
+        </p:txBody>
+      </p:sp>
+    </p:spTree>
+    <p:extLst>
+      <p:ext uri="{BB962C8B-B14F-4D97-AF65-F5344CB8AC3E}">
+        <p14:creationId xmlns:p14="http://schemas.microsoft.com/office/powerpoint/2010/main" val="3658946405"/>
+      </p:ext>
+    </p:extLst>
+  </p:cSld>
+  <p:clrMapOvr>
+    <a:masterClrMapping/>
+  </p:clrMapOvr>
+</p:sld>
+</file>
+
+<file path=ppt/slides/slide8.xml><?xml version="1.0" encoding="utf-8"?>
+<p:sld xmlns:a="http://schemas.openxmlformats.org/drawingml/2006/main" xmlns:r="http://schemas.openxmlformats.org/officeDocument/2006/relationships" xmlns:p="http://schemas.openxmlformats.org/presentationml/2006/main">
+  <p:cSld>
+    <p:spTree>
+      <p:nvGrpSpPr>
+        <p:cNvPr id="1" name=""/>
+        <p:cNvGrpSpPr/>
+        <p:nvPr/>
+      </p:nvGrpSpPr>
+      <p:grpSpPr>
+        <a:xfrm>
+          <a:off x="0" y="0"/>
+          <a:ext cx="0" cy="0"/>
+          <a:chOff x="0" y="0"/>
+          <a:chExt cx="0" cy="0"/>
+        </a:xfrm>
+      </p:grpSpPr>
+      <p:grpSp>
+        <p:nvGrpSpPr>
+          <p:cNvPr id="9" name="그룹 8">
+            <a:extLst>
+              <a:ext uri="{FF2B5EF4-FFF2-40B4-BE49-F238E27FC236}">
+                <a16:creationId xmlns:a16="http://schemas.microsoft.com/office/drawing/2014/main" id="{E2F8DDAA-489A-453A-B6FE-6BE581E5607A}"/>
+              </a:ext>
+            </a:extLst>
+          </p:cNvPr>
+          <p:cNvGrpSpPr/>
+          <p:nvPr/>
+        </p:nvGrpSpPr>
+        <p:grpSpPr>
+          <a:xfrm>
+            <a:off x="1715540" y="793054"/>
+            <a:ext cx="8760920" cy="5271892"/>
+            <a:chOff x="2567233" y="793054"/>
+            <a:chExt cx="8760920" cy="5271892"/>
+          </a:xfrm>
+        </p:grpSpPr>
+        <p:pic>
+          <p:nvPicPr>
+            <p:cNvPr id="4" name="그림 3">
+              <a:extLst>
+                <a:ext uri="{FF2B5EF4-FFF2-40B4-BE49-F238E27FC236}">
+                  <a16:creationId xmlns:a16="http://schemas.microsoft.com/office/drawing/2014/main" id="{67F62826-154B-4B49-889B-05340CC4532E}"/>
+                </a:ext>
+              </a:extLst>
+            </p:cNvPr>
+            <p:cNvPicPr>
+              <a:picLocks noChangeAspect="1"/>
+            </p:cNvPicPr>
+            <p:nvPr/>
+          </p:nvPicPr>
+          <p:blipFill>
+            <a:blip r:embed="rId2"/>
+            <a:stretch>
+              <a:fillRect/>
+            </a:stretch>
+          </p:blipFill>
+          <p:spPr>
+            <a:xfrm>
+              <a:off x="2567233" y="793054"/>
+              <a:ext cx="7057534" cy="5271892"/>
+            </a:xfrm>
+            <a:prstGeom prst="rect">
+              <a:avLst/>
+            </a:prstGeom>
+          </p:spPr>
+        </p:pic>
+        <p:cxnSp>
+          <p:nvCxnSpPr>
+            <p:cNvPr id="6" name="직선 화살표 연결선 5">
+              <a:extLst>
+                <a:ext uri="{FF2B5EF4-FFF2-40B4-BE49-F238E27FC236}">
+                  <a16:creationId xmlns:a16="http://schemas.microsoft.com/office/drawing/2014/main" id="{33AC5D38-18D9-4223-89E9-4F2E7AEA104F}"/>
+                </a:ext>
+              </a:extLst>
+            </p:cNvPr>
+            <p:cNvCxnSpPr>
+              <a:cxnSpLocks/>
+            </p:cNvCxnSpPr>
+            <p:nvPr/>
+          </p:nvCxnSpPr>
+          <p:spPr>
+            <a:xfrm flipH="1">
+              <a:off x="9030879" y="1621410"/>
+              <a:ext cx="716436" cy="0"/>
+            </a:xfrm>
+            <a:prstGeom prst="straightConnector1">
+              <a:avLst/>
+            </a:prstGeom>
+            <a:ln w="38100">
+              <a:solidFill>
+                <a:schemeClr val="tx1"/>
+              </a:solidFill>
+              <a:tailEnd type="triangle"/>
+            </a:ln>
+          </p:spPr>
+          <p:style>
+            <a:lnRef idx="1">
+              <a:schemeClr val="accent1"/>
+            </a:lnRef>
+            <a:fillRef idx="0">
+              <a:schemeClr val="accent1"/>
+            </a:fillRef>
+            <a:effectRef idx="0">
+              <a:schemeClr val="accent1"/>
+            </a:effectRef>
+            <a:fontRef idx="minor">
+              <a:schemeClr val="tx1"/>
+            </a:fontRef>
+          </p:style>
+        </p:cxnSp>
+        <p:sp>
+          <p:nvSpPr>
+            <p:cNvPr id="7" name="TextBox 6">
+              <a:extLst>
+                <a:ext uri="{FF2B5EF4-FFF2-40B4-BE49-F238E27FC236}">
+                  <a16:creationId xmlns:a16="http://schemas.microsoft.com/office/drawing/2014/main" id="{8687E63A-6F20-452C-A0F6-CF565DB8A3C2}"/>
+                </a:ext>
+              </a:extLst>
+            </p:cNvPr>
+            <p:cNvSpPr txBox="1"/>
+            <p:nvPr/>
+          </p:nvSpPr>
+          <p:spPr>
+            <a:xfrm>
+              <a:off x="9907571" y="1436744"/>
+              <a:ext cx="1420582" cy="369332"/>
+            </a:xfrm>
+            <a:prstGeom prst="rect">
+              <a:avLst/>
+            </a:prstGeom>
+            <a:noFill/>
+            <a:ln w="38100">
+              <a:solidFill>
+                <a:schemeClr val="tx1"/>
+              </a:solidFill>
+            </a:ln>
+          </p:spPr>
+          <p:txBody>
+            <a:bodyPr wrap="none" rtlCol="0">
+              <a:spAutoFit/>
+            </a:bodyPr>
+            <a:lstStyle/>
+            <a:p>
+              <a:r>
+                <a:rPr lang="ko-KR" altLang="en-US"/>
+                <a:t>실제 </a:t>
+              </a:r>
+              <a:r>
+                <a:rPr lang="ko-KR" altLang="en-US" dirty="0"/>
+                <a:t>모</a:t>
+              </a:r>
+              <a:r>
+                <a:rPr lang="ko-KR" altLang="en-US"/>
+                <a:t>평균</a:t>
+              </a:r>
+              <a:endParaRPr lang="ko-KR" altLang="en-US" dirty="0"/>
+            </a:p>
+          </p:txBody>
+        </p:sp>
+      </p:grpSp>
+    </p:spTree>
+    <p:extLst>
+      <p:ext uri="{BB962C8B-B14F-4D97-AF65-F5344CB8AC3E}">
+        <p14:creationId xmlns:p14="http://schemas.microsoft.com/office/powerpoint/2010/main" val="3982488976"/>
+      </p:ext>
+    </p:extLst>
+  </p:cSld>
+  <p:clrMapOvr>
+    <a:masterClrMapping/>
+  </p:clrMapOvr>
+</p:sld>
+</file>
+
 <file path=ppt/theme/theme1.xml><?xml version="1.0" encoding="utf-8"?>
 <a:theme xmlns:a="http://schemas.openxmlformats.org/drawingml/2006/main" name="Office 테마">
   <a:themeElements>

</xml_diff>